<commit_message>
formatting figures for revisions
</commit_message>
<xml_diff>
--- a/figures/noclonededlabelled.pptx
+++ b/figures/noclonededlabelled.pptx
@@ -5,7 +5,8 @@
     <p:sldMasterId id="2147483648" r:id="rId1"/>
   </p:sldMasterIdLst>
   <p:sldIdLst>
-    <p:sldId id="256" r:id="rId2"/>
+    <p:sldId id="257" r:id="rId2"/>
+    <p:sldId id="256" r:id="rId3"/>
   </p:sldIdLst>
   <p:sldSz cx="12192000" cy="6858000"/>
   <p:notesSz cx="6858000" cy="9144000"/>
@@ -104,6 +105,11 @@
       </a:defRPr>
     </a:lvl9pPr>
   </p:defaultTextStyle>
+  <p:extLst>
+    <p:ext uri="{EFAFB233-063F-42B5-8137-9DF3F51BA10A}">
+      <p15:sldGuideLst xmlns:p15="http://schemas.microsoft.com/office/powerpoint/2012/main"/>
+    </p:ext>
+  </p:extLst>
 </p:presentation>
 </file>
 
@@ -254,7 +260,7 @@
           <a:p>
             <a:fld id="{D6D5E349-8D89-4874-BBDF-5814994577D7}" type="datetimeFigureOut">
               <a:rPr lang="en-US" smtClean="0"/>
-              <a:t>3/15/2023</a:t>
+              <a:t>4/15/2023</a:t>
             </a:fld>
             <a:endParaRPr lang="en-US"/>
           </a:p>
@@ -452,7 +458,7 @@
           <a:p>
             <a:fld id="{D6D5E349-8D89-4874-BBDF-5814994577D7}" type="datetimeFigureOut">
               <a:rPr lang="en-US" smtClean="0"/>
-              <a:t>3/15/2023</a:t>
+              <a:t>4/15/2023</a:t>
             </a:fld>
             <a:endParaRPr lang="en-US"/>
           </a:p>
@@ -660,7 +666,7 @@
           <a:p>
             <a:fld id="{D6D5E349-8D89-4874-BBDF-5814994577D7}" type="datetimeFigureOut">
               <a:rPr lang="en-US" smtClean="0"/>
-              <a:t>3/15/2023</a:t>
+              <a:t>4/15/2023</a:t>
             </a:fld>
             <a:endParaRPr lang="en-US"/>
           </a:p>
@@ -858,7 +864,7 @@
           <a:p>
             <a:fld id="{D6D5E349-8D89-4874-BBDF-5814994577D7}" type="datetimeFigureOut">
               <a:rPr lang="en-US" smtClean="0"/>
-              <a:t>3/15/2023</a:t>
+              <a:t>4/15/2023</a:t>
             </a:fld>
             <a:endParaRPr lang="en-US"/>
           </a:p>
@@ -1133,7 +1139,7 @@
           <a:p>
             <a:fld id="{D6D5E349-8D89-4874-BBDF-5814994577D7}" type="datetimeFigureOut">
               <a:rPr lang="en-US" smtClean="0"/>
-              <a:t>3/15/2023</a:t>
+              <a:t>4/15/2023</a:t>
             </a:fld>
             <a:endParaRPr lang="en-US"/>
           </a:p>
@@ -1398,7 +1404,7 @@
           <a:p>
             <a:fld id="{D6D5E349-8D89-4874-BBDF-5814994577D7}" type="datetimeFigureOut">
               <a:rPr lang="en-US" smtClean="0"/>
-              <a:t>3/15/2023</a:t>
+              <a:t>4/15/2023</a:t>
             </a:fld>
             <a:endParaRPr lang="en-US"/>
           </a:p>
@@ -1810,7 +1816,7 @@
           <a:p>
             <a:fld id="{D6D5E349-8D89-4874-BBDF-5814994577D7}" type="datetimeFigureOut">
               <a:rPr lang="en-US" smtClean="0"/>
-              <a:t>3/15/2023</a:t>
+              <a:t>4/15/2023</a:t>
             </a:fld>
             <a:endParaRPr lang="en-US"/>
           </a:p>
@@ -1951,7 +1957,7 @@
           <a:p>
             <a:fld id="{D6D5E349-8D89-4874-BBDF-5814994577D7}" type="datetimeFigureOut">
               <a:rPr lang="en-US" smtClean="0"/>
-              <a:t>3/15/2023</a:t>
+              <a:t>4/15/2023</a:t>
             </a:fld>
             <a:endParaRPr lang="en-US"/>
           </a:p>
@@ -2064,7 +2070,7 @@
           <a:p>
             <a:fld id="{D6D5E349-8D89-4874-BBDF-5814994577D7}" type="datetimeFigureOut">
               <a:rPr lang="en-US" smtClean="0"/>
-              <a:t>3/15/2023</a:t>
+              <a:t>4/15/2023</a:t>
             </a:fld>
             <a:endParaRPr lang="en-US"/>
           </a:p>
@@ -2375,7 +2381,7 @@
           <a:p>
             <a:fld id="{D6D5E349-8D89-4874-BBDF-5814994577D7}" type="datetimeFigureOut">
               <a:rPr lang="en-US" smtClean="0"/>
-              <a:t>3/15/2023</a:t>
+              <a:t>4/15/2023</a:t>
             </a:fld>
             <a:endParaRPr lang="en-US"/>
           </a:p>
@@ -2663,7 +2669,7 @@
           <a:p>
             <a:fld id="{D6D5E349-8D89-4874-BBDF-5814994577D7}" type="datetimeFigureOut">
               <a:rPr lang="en-US" smtClean="0"/>
-              <a:t>3/15/2023</a:t>
+              <a:t>4/15/2023</a:t>
             </a:fld>
             <a:endParaRPr lang="en-US"/>
           </a:p>
@@ -2904,7 +2910,7 @@
           <a:p>
             <a:fld id="{D6D5E349-8D89-4874-BBDF-5814994577D7}" type="datetimeFigureOut">
               <a:rPr lang="en-US" smtClean="0"/>
-              <a:t>3/15/2023</a:t>
+              <a:t>4/15/2023</a:t>
             </a:fld>
             <a:endParaRPr lang="en-US"/>
           </a:p>
@@ -3305,6 +3311,173 @@
 </file>
 
 <file path=ppt/slides/slide1.xml><?xml version="1.0" encoding="utf-8"?>
+<p:sld xmlns:a="http://schemas.openxmlformats.org/drawingml/2006/main" xmlns:r="http://schemas.openxmlformats.org/officeDocument/2006/relationships" xmlns:p="http://schemas.openxmlformats.org/presentationml/2006/main">
+  <p:cSld>
+    <p:spTree>
+      <p:nvGrpSpPr>
+        <p:cNvPr id="1" name=""/>
+        <p:cNvGrpSpPr/>
+        <p:nvPr/>
+      </p:nvGrpSpPr>
+      <p:grpSpPr>
+        <a:xfrm>
+          <a:off x="0" y="0"/>
+          <a:ext cx="0" cy="0"/>
+          <a:chOff x="0" y="0"/>
+          <a:chExt cx="0" cy="0"/>
+        </a:xfrm>
+      </p:grpSpPr>
+      <p:grpSp>
+        <p:nvGrpSpPr>
+          <p:cNvPr id="8" name="Group 7">
+            <a:extLst>
+              <a:ext uri="{FF2B5EF4-FFF2-40B4-BE49-F238E27FC236}">
+                <a16:creationId xmlns:a16="http://schemas.microsoft.com/office/drawing/2014/main" id="{C8ADAB5C-0581-A05A-C5D9-6713A0319DBE}"/>
+              </a:ext>
+            </a:extLst>
+          </p:cNvPr>
+          <p:cNvGrpSpPr/>
+          <p:nvPr/>
+        </p:nvGrpSpPr>
+        <p:grpSpPr>
+          <a:xfrm>
+            <a:off x="609589" y="1142995"/>
+            <a:ext cx="10972822" cy="4572009"/>
+            <a:chOff x="609589" y="1142995"/>
+            <a:chExt cx="10972822" cy="4572009"/>
+          </a:xfrm>
+        </p:grpSpPr>
+        <p:pic>
+          <p:nvPicPr>
+            <p:cNvPr id="5" name="Picture 4" descr="A picture containing text&#10;&#10;Description automatically generated">
+              <a:extLst>
+                <a:ext uri="{FF2B5EF4-FFF2-40B4-BE49-F238E27FC236}">
+                  <a16:creationId xmlns:a16="http://schemas.microsoft.com/office/drawing/2014/main" id="{F001714D-B548-031D-0646-A4053BE0F538}"/>
+                </a:ext>
+              </a:extLst>
+            </p:cNvPr>
+            <p:cNvPicPr>
+              <a:picLocks noChangeAspect="1"/>
+            </p:cNvPicPr>
+            <p:nvPr/>
+          </p:nvPicPr>
+          <p:blipFill>
+            <a:blip r:embed="rId2">
+              <a:extLst>
+                <a:ext uri="{28A0092B-C50C-407E-A947-70E740481C1C}">
+                  <a14:useLocalDpi xmlns:a14="http://schemas.microsoft.com/office/drawing/2010/main" val="0"/>
+                </a:ext>
+              </a:extLst>
+            </a:blip>
+            <a:stretch>
+              <a:fillRect/>
+            </a:stretch>
+          </p:blipFill>
+          <p:spPr>
+            <a:xfrm>
+              <a:off x="609589" y="1142995"/>
+              <a:ext cx="10972822" cy="4572009"/>
+            </a:xfrm>
+            <a:prstGeom prst="rect">
+              <a:avLst/>
+            </a:prstGeom>
+          </p:spPr>
+        </p:pic>
+        <p:sp>
+          <p:nvSpPr>
+            <p:cNvPr id="6" name="TextBox 5">
+              <a:extLst>
+                <a:ext uri="{FF2B5EF4-FFF2-40B4-BE49-F238E27FC236}">
+                  <a16:creationId xmlns:a16="http://schemas.microsoft.com/office/drawing/2014/main" id="{6A0D9C16-0510-9844-0B6D-77135F19FEBF}"/>
+                </a:ext>
+              </a:extLst>
+            </p:cNvPr>
+            <p:cNvSpPr txBox="1"/>
+            <p:nvPr/>
+          </p:nvSpPr>
+          <p:spPr>
+            <a:xfrm>
+              <a:off x="8240111" y="4801968"/>
+              <a:ext cx="1229710" cy="338554"/>
+            </a:xfrm>
+            <a:prstGeom prst="rect">
+              <a:avLst/>
+            </a:prstGeom>
+            <a:solidFill>
+              <a:schemeClr val="bg1"/>
+            </a:solidFill>
+          </p:spPr>
+          <p:txBody>
+            <a:bodyPr wrap="square" rtlCol="0">
+              <a:spAutoFit/>
+            </a:bodyPr>
+            <a:lstStyle/>
+            <a:p>
+              <a:r>
+                <a:rPr lang="en-US" sz="1600" dirty="0">
+                  <a:latin typeface="Helvetica" panose="020B0604020202020204" pitchFamily="34" charset="0"/>
+                  <a:cs typeface="Helvetica" panose="020B0604020202020204" pitchFamily="34" charset="0"/>
+                </a:rPr>
+                <a:t>Admixed</a:t>
+              </a:r>
+            </a:p>
+          </p:txBody>
+        </p:sp>
+        <p:sp>
+          <p:nvSpPr>
+            <p:cNvPr id="7" name="TextBox 6">
+              <a:extLst>
+                <a:ext uri="{FF2B5EF4-FFF2-40B4-BE49-F238E27FC236}">
+                  <a16:creationId xmlns:a16="http://schemas.microsoft.com/office/drawing/2014/main" id="{5436825D-6D24-0E55-1D69-7C47FB0678C3}"/>
+                </a:ext>
+              </a:extLst>
+            </p:cNvPr>
+            <p:cNvSpPr txBox="1"/>
+            <p:nvPr/>
+          </p:nvSpPr>
+          <p:spPr>
+            <a:xfrm>
+              <a:off x="9685283" y="5290697"/>
+              <a:ext cx="1550276" cy="338554"/>
+            </a:xfrm>
+            <a:prstGeom prst="rect">
+              <a:avLst/>
+            </a:prstGeom>
+            <a:solidFill>
+              <a:schemeClr val="bg1"/>
+            </a:solidFill>
+          </p:spPr>
+          <p:txBody>
+            <a:bodyPr wrap="square" rtlCol="0">
+              <a:spAutoFit/>
+            </a:bodyPr>
+            <a:lstStyle/>
+            <a:p>
+              <a:r>
+                <a:rPr lang="en-US" sz="1600" dirty="0">
+                  <a:latin typeface="Helvetica" panose="020B0604020202020204" pitchFamily="34" charset="0"/>
+                  <a:cs typeface="Helvetica" panose="020B0604020202020204" pitchFamily="34" charset="0"/>
+                </a:rPr>
+                <a:t>Ft. Lauderdale</a:t>
+              </a:r>
+            </a:p>
+          </p:txBody>
+        </p:sp>
+      </p:grpSp>
+    </p:spTree>
+    <p:extLst>
+      <p:ext uri="{BB962C8B-B14F-4D97-AF65-F5344CB8AC3E}">
+        <p14:creationId xmlns:p14="http://schemas.microsoft.com/office/powerpoint/2010/main" val="2371331441"/>
+      </p:ext>
+    </p:extLst>
+  </p:cSld>
+  <p:clrMapOvr>
+    <a:masterClrMapping/>
+  </p:clrMapOvr>
+</p:sld>
+</file>
+
+<file path=ppt/slides/slide2.xml><?xml version="1.0" encoding="utf-8"?>
 <p:sld xmlns:a="http://schemas.openxmlformats.org/drawingml/2006/main" xmlns:r="http://schemas.openxmlformats.org/officeDocument/2006/relationships" xmlns:p="http://schemas.openxmlformats.org/presentationml/2006/main">
   <p:cSld>
     <p:spTree>

</xml_diff>